<commit_message>
Update Align and Adjoin tests
</commit_message>
<xml_diff>
--- a/doc/test/PositionsLab/PositionsLabAdjoin.pptx
+++ b/doc/test/PositionsLab/PositionsLabAdjoin.pptx
@@ -9,8 +9,8 @@
   <p:sldIdLst>
     <p:sldId id="287" r:id="rId4"/>
     <p:sldId id="256" r:id="rId5"/>
-    <p:sldId id="292" r:id="rId6"/>
-    <p:sldId id="294" r:id="rId7"/>
+    <p:sldId id="294" r:id="rId6"/>
+    <p:sldId id="292" r:id="rId7"/>
     <p:sldId id="358" r:id="rId8"/>
     <p:sldId id="359" r:id="rId9"/>
     <p:sldId id="360" r:id="rId10"/>
@@ -130,8 +130,8 @@
         <p14:section name="Align by Slide" id="{A3A2B0AB-762C-4281-AA7B-EF7E134E0DC4}">
           <p14:sldIdLst>
             <p14:sldId id="256"/>
+            <p14:sldId id="294"/>
             <p14:sldId id="292"/>
-            <p14:sldId id="294"/>
             <p14:sldId id="358"/>
             <p14:sldId id="359"/>
             <p14:sldId id="360"/>
@@ -10324,50 +10324,168 @@
       </p:grpSpPr>
       <p:sp>
         <p:nvSpPr>
-          <p:cNvPr id="2" name="Title 1"/>
-          <p:cNvSpPr>
-            <a:spLocks noGrp="1"/>
-          </p:cNvSpPr>
-          <p:nvPr>
-            <p:ph type="title"/>
-          </p:nvPr>
-        </p:nvSpPr>
-        <p:spPr/>
-        <p:txBody>
-          <a:bodyPr/>
-          <a:lstStyle/>
-          <a:p>
-            <a:r>
-              <a:rPr lang="en-US" dirty="0"/>
-              <a:t>Adjoin:: w/o Align</a:t>
-            </a:r>
-            <a:endParaRPr lang="en-SG" dirty="0"/>
-          </a:p>
-        </p:txBody>
-      </p:sp>
-      <p:sp>
-        <p:nvSpPr>
-          <p:cNvPr id="3" name="Content Placeholder 2"/>
-          <p:cNvSpPr>
-            <a:spLocks noGrp="1"/>
-          </p:cNvSpPr>
-          <p:nvPr>
-            <p:ph idx="1"/>
-          </p:nvPr>
-        </p:nvSpPr>
-        <p:spPr/>
-        <p:txBody>
-          <a:bodyPr/>
-          <a:lstStyle/>
-          <a:p>
-            <a:endParaRPr lang="en-SG" dirty="0"/>
+          <p:cNvPr id="4" name="Rectangle 3"/>
+          <p:cNvSpPr/>
+          <p:nvPr/>
+        </p:nvSpPr>
+        <p:spPr>
+          <a:xfrm>
+            <a:off x="1623148" y="1447800"/>
+            <a:ext cx="1257300" cy="838200"/>
+          </a:xfrm>
+          <a:prstGeom prst="rect">
+            <a:avLst/>
+          </a:prstGeom>
+        </p:spPr>
+        <p:style>
+          <a:lnRef idx="2">
+            <a:schemeClr val="accent1">
+              <a:shade val="50000"/>
+            </a:schemeClr>
+          </a:lnRef>
+          <a:fillRef idx="1">
+            <a:schemeClr val="accent1"/>
+          </a:fillRef>
+          <a:effectRef idx="0">
+            <a:schemeClr val="accent1"/>
+          </a:effectRef>
+          <a:fontRef idx="minor">
+            <a:schemeClr val="lt1"/>
+          </a:fontRef>
+        </p:style>
+        <p:txBody>
+          <a:bodyPr rtlCol="0" anchor="ctr"/>
+          <a:lstStyle/>
+          <a:p>
+            <a:pPr algn="ctr"/>
+            <a:endParaRPr lang="en-US"/>
+          </a:p>
+        </p:txBody>
+      </p:sp>
+      <p:sp>
+        <p:nvSpPr>
+          <p:cNvPr id="5" name="Oval 4"/>
+          <p:cNvSpPr/>
+          <p:nvPr/>
+        </p:nvSpPr>
+        <p:spPr>
+          <a:xfrm>
+            <a:off x="4431228" y="2133879"/>
+            <a:ext cx="978972" cy="978972"/>
+          </a:xfrm>
+          <a:prstGeom prst="ellipse">
+            <a:avLst/>
+          </a:prstGeom>
+        </p:spPr>
+        <p:style>
+          <a:lnRef idx="2">
+            <a:schemeClr val="accent1">
+              <a:shade val="50000"/>
+            </a:schemeClr>
+          </a:lnRef>
+          <a:fillRef idx="1">
+            <a:schemeClr val="accent1"/>
+          </a:fillRef>
+          <a:effectRef idx="0">
+            <a:schemeClr val="accent1"/>
+          </a:effectRef>
+          <a:fontRef idx="minor">
+            <a:schemeClr val="lt1"/>
+          </a:fontRef>
+        </p:style>
+        <p:txBody>
+          <a:bodyPr rtlCol="0" anchor="ctr"/>
+          <a:lstStyle/>
+          <a:p>
+            <a:pPr algn="ctr"/>
+            <a:endParaRPr lang="en-US"/>
+          </a:p>
+        </p:txBody>
+      </p:sp>
+      <p:sp>
+        <p:nvSpPr>
+          <p:cNvPr id="6" name="Right Arrow 5"/>
+          <p:cNvSpPr/>
+          <p:nvPr/>
+        </p:nvSpPr>
+        <p:spPr>
+          <a:xfrm rot="18000000">
+            <a:off x="6139946" y="4452684"/>
+            <a:ext cx="2120755" cy="631714"/>
+          </a:xfrm>
+          <a:prstGeom prst="rightArrow">
+            <a:avLst/>
+          </a:prstGeom>
+        </p:spPr>
+        <p:style>
+          <a:lnRef idx="2">
+            <a:schemeClr val="accent1">
+              <a:shade val="50000"/>
+            </a:schemeClr>
+          </a:lnRef>
+          <a:fillRef idx="1">
+            <a:schemeClr val="accent1"/>
+          </a:fillRef>
+          <a:effectRef idx="0">
+            <a:schemeClr val="accent1"/>
+          </a:effectRef>
+          <a:fontRef idx="minor">
+            <a:schemeClr val="lt1"/>
+          </a:fontRef>
+        </p:style>
+        <p:txBody>
+          <a:bodyPr rtlCol="0" anchor="ctr"/>
+          <a:lstStyle/>
+          <a:p>
+            <a:pPr algn="ctr"/>
+            <a:endParaRPr lang="en-US"/>
+          </a:p>
+        </p:txBody>
+      </p:sp>
+      <p:sp>
+        <p:nvSpPr>
+          <p:cNvPr id="7" name="Rectangle 6"/>
+          <p:cNvSpPr/>
+          <p:nvPr/>
+        </p:nvSpPr>
+        <p:spPr>
+          <a:xfrm rot="18672083">
+            <a:off x="2164646" y="4021378"/>
+            <a:ext cx="1379725" cy="919817"/>
+          </a:xfrm>
+          <a:prstGeom prst="rect">
+            <a:avLst/>
+          </a:prstGeom>
+        </p:spPr>
+        <p:style>
+          <a:lnRef idx="2">
+            <a:schemeClr val="accent1">
+              <a:shade val="50000"/>
+            </a:schemeClr>
+          </a:lnRef>
+          <a:fillRef idx="1">
+            <a:schemeClr val="accent1"/>
+          </a:fillRef>
+          <a:effectRef idx="0">
+            <a:schemeClr val="accent1"/>
+          </a:effectRef>
+          <a:fontRef idx="minor">
+            <a:schemeClr val="lt1"/>
+          </a:fontRef>
+        </p:style>
+        <p:txBody>
+          <a:bodyPr rtlCol="0" anchor="ctr"/>
+          <a:lstStyle/>
+          <a:p>
+            <a:pPr algn="ctr"/>
+            <a:endParaRPr lang="en-US"/>
           </a:p>
         </p:txBody>
       </p:sp>
     </p:spTree>
     <p:extLst>
       <p:ext uri="{BB962C8B-B14F-4D97-AF65-F5344CB8AC3E}">
-        <p14:creationId xmlns:p14="http://schemas.microsoft.com/office/powerpoint/2010/main" val="1286891872"/>
+        <p14:creationId xmlns:p14="http://schemas.microsoft.com/office/powerpoint/2010/main" val="3658852901"/>
       </p:ext>
     </p:extLst>
   </p:cSld>
@@ -10396,168 +10514,50 @@
       </p:grpSpPr>
       <p:sp>
         <p:nvSpPr>
-          <p:cNvPr id="4" name="Rectangle 3"/>
-          <p:cNvSpPr/>
-          <p:nvPr/>
-        </p:nvSpPr>
-        <p:spPr>
-          <a:xfrm>
-            <a:off x="1623148" y="1447800"/>
-            <a:ext cx="1257300" cy="838200"/>
-          </a:xfrm>
-          <a:prstGeom prst="rect">
-            <a:avLst/>
-          </a:prstGeom>
-        </p:spPr>
-        <p:style>
-          <a:lnRef idx="2">
-            <a:schemeClr val="accent1">
-              <a:shade val="50000"/>
-            </a:schemeClr>
-          </a:lnRef>
-          <a:fillRef idx="1">
-            <a:schemeClr val="accent1"/>
-          </a:fillRef>
-          <a:effectRef idx="0">
-            <a:schemeClr val="accent1"/>
-          </a:effectRef>
-          <a:fontRef idx="minor">
-            <a:schemeClr val="lt1"/>
-          </a:fontRef>
-        </p:style>
-        <p:txBody>
-          <a:bodyPr rtlCol="0" anchor="ctr"/>
-          <a:lstStyle/>
-          <a:p>
-            <a:pPr algn="ctr"/>
-            <a:endParaRPr lang="en-US"/>
-          </a:p>
-        </p:txBody>
-      </p:sp>
-      <p:sp>
-        <p:nvSpPr>
-          <p:cNvPr id="5" name="Oval 4"/>
-          <p:cNvSpPr/>
-          <p:nvPr/>
-        </p:nvSpPr>
-        <p:spPr>
-          <a:xfrm>
-            <a:off x="4431228" y="2133879"/>
-            <a:ext cx="978972" cy="978972"/>
-          </a:xfrm>
-          <a:prstGeom prst="ellipse">
-            <a:avLst/>
-          </a:prstGeom>
-        </p:spPr>
-        <p:style>
-          <a:lnRef idx="2">
-            <a:schemeClr val="accent1">
-              <a:shade val="50000"/>
-            </a:schemeClr>
-          </a:lnRef>
-          <a:fillRef idx="1">
-            <a:schemeClr val="accent1"/>
-          </a:fillRef>
-          <a:effectRef idx="0">
-            <a:schemeClr val="accent1"/>
-          </a:effectRef>
-          <a:fontRef idx="minor">
-            <a:schemeClr val="lt1"/>
-          </a:fontRef>
-        </p:style>
-        <p:txBody>
-          <a:bodyPr rtlCol="0" anchor="ctr"/>
-          <a:lstStyle/>
-          <a:p>
-            <a:pPr algn="ctr"/>
-            <a:endParaRPr lang="en-US"/>
-          </a:p>
-        </p:txBody>
-      </p:sp>
-      <p:sp>
-        <p:nvSpPr>
-          <p:cNvPr id="6" name="Right Arrow 5"/>
-          <p:cNvSpPr/>
-          <p:nvPr/>
-        </p:nvSpPr>
-        <p:spPr>
-          <a:xfrm rot="18000000">
-            <a:off x="6139946" y="4452684"/>
-            <a:ext cx="2120755" cy="631714"/>
-          </a:xfrm>
-          <a:prstGeom prst="rightArrow">
-            <a:avLst/>
-          </a:prstGeom>
-        </p:spPr>
-        <p:style>
-          <a:lnRef idx="2">
-            <a:schemeClr val="accent1">
-              <a:shade val="50000"/>
-            </a:schemeClr>
-          </a:lnRef>
-          <a:fillRef idx="1">
-            <a:schemeClr val="accent1"/>
-          </a:fillRef>
-          <a:effectRef idx="0">
-            <a:schemeClr val="accent1"/>
-          </a:effectRef>
-          <a:fontRef idx="minor">
-            <a:schemeClr val="lt1"/>
-          </a:fontRef>
-        </p:style>
-        <p:txBody>
-          <a:bodyPr rtlCol="0" anchor="ctr"/>
-          <a:lstStyle/>
-          <a:p>
-            <a:pPr algn="ctr"/>
-            <a:endParaRPr lang="en-US"/>
-          </a:p>
-        </p:txBody>
-      </p:sp>
-      <p:sp>
-        <p:nvSpPr>
-          <p:cNvPr id="7" name="Rectangle 6"/>
-          <p:cNvSpPr/>
-          <p:nvPr/>
-        </p:nvSpPr>
-        <p:spPr>
-          <a:xfrm rot="18672083">
-            <a:off x="2164646" y="4021378"/>
-            <a:ext cx="1379725" cy="919817"/>
-          </a:xfrm>
-          <a:prstGeom prst="rect">
-            <a:avLst/>
-          </a:prstGeom>
-        </p:spPr>
-        <p:style>
-          <a:lnRef idx="2">
-            <a:schemeClr val="accent1">
-              <a:shade val="50000"/>
-            </a:schemeClr>
-          </a:lnRef>
-          <a:fillRef idx="1">
-            <a:schemeClr val="accent1"/>
-          </a:fillRef>
-          <a:effectRef idx="0">
-            <a:schemeClr val="accent1"/>
-          </a:effectRef>
-          <a:fontRef idx="minor">
-            <a:schemeClr val="lt1"/>
-          </a:fontRef>
-        </p:style>
-        <p:txBody>
-          <a:bodyPr rtlCol="0" anchor="ctr"/>
-          <a:lstStyle/>
-          <a:p>
-            <a:pPr algn="ctr"/>
-            <a:endParaRPr lang="en-US"/>
+          <p:cNvPr id="2" name="Title 1"/>
+          <p:cNvSpPr>
+            <a:spLocks noGrp="1"/>
+          </p:cNvSpPr>
+          <p:nvPr>
+            <p:ph type="title"/>
+          </p:nvPr>
+        </p:nvSpPr>
+        <p:spPr/>
+        <p:txBody>
+          <a:bodyPr/>
+          <a:lstStyle/>
+          <a:p>
+            <a:r>
+              <a:rPr lang="en-US" dirty="0"/>
+              <a:t>Adjoin:: w/o Align</a:t>
+            </a:r>
+            <a:endParaRPr lang="en-SG" dirty="0"/>
+          </a:p>
+        </p:txBody>
+      </p:sp>
+      <p:sp>
+        <p:nvSpPr>
+          <p:cNvPr id="3" name="Content Placeholder 2"/>
+          <p:cNvSpPr>
+            <a:spLocks noGrp="1"/>
+          </p:cNvSpPr>
+          <p:nvPr>
+            <p:ph idx="1"/>
+          </p:nvPr>
+        </p:nvSpPr>
+        <p:spPr/>
+        <p:txBody>
+          <a:bodyPr/>
+          <a:lstStyle/>
+          <a:p>
+            <a:endParaRPr lang="en-SG" dirty="0"/>
           </a:p>
         </p:txBody>
       </p:sp>
     </p:spTree>
     <p:extLst>
       <p:ext uri="{BB962C8B-B14F-4D97-AF65-F5344CB8AC3E}">
-        <p14:creationId xmlns:p14="http://schemas.microsoft.com/office/powerpoint/2010/main" val="3658852901"/>
+        <p14:creationId xmlns:p14="http://schemas.microsoft.com/office/powerpoint/2010/main" val="1286891872"/>
       </p:ext>
     </p:extLst>
   </p:cSld>

</xml_diff>